<commit_message>
Revised Ipc-Logger doc. Added creating crash dump file in ErrLog class.
</commit_message>
<xml_diff>
--- a/Doc/Libs/ZSIpcLog/Overview.pptx
+++ b/Doc/Libs/ZSIpcLog/Overview.pptx
@@ -259,7 +259,7 @@
           <a:p>
             <a:fld id="{99BCB60A-E9EF-4256-A8F3-CDC6B78250BE}" type="datetimeFigureOut">
               <a:rPr lang="de-DE" smtClean="0"/>
-              <a:t>10.03.2022</a:t>
+              <a:t>29.09.2022</a:t>
             </a:fld>
             <a:endParaRPr lang="de-DE"/>
           </a:p>
@@ -457,7 +457,7 @@
           <a:p>
             <a:fld id="{99BCB60A-E9EF-4256-A8F3-CDC6B78250BE}" type="datetimeFigureOut">
               <a:rPr lang="de-DE" smtClean="0"/>
-              <a:t>10.03.2022</a:t>
+              <a:t>29.09.2022</a:t>
             </a:fld>
             <a:endParaRPr lang="de-DE"/>
           </a:p>
@@ -665,7 +665,7 @@
           <a:p>
             <a:fld id="{99BCB60A-E9EF-4256-A8F3-CDC6B78250BE}" type="datetimeFigureOut">
               <a:rPr lang="de-DE" smtClean="0"/>
-              <a:t>10.03.2022</a:t>
+              <a:t>29.09.2022</a:t>
             </a:fld>
             <a:endParaRPr lang="de-DE"/>
           </a:p>
@@ -863,7 +863,7 @@
           <a:p>
             <a:fld id="{99BCB60A-E9EF-4256-A8F3-CDC6B78250BE}" type="datetimeFigureOut">
               <a:rPr lang="de-DE" smtClean="0"/>
-              <a:t>10.03.2022</a:t>
+              <a:t>29.09.2022</a:t>
             </a:fld>
             <a:endParaRPr lang="de-DE"/>
           </a:p>
@@ -1138,7 +1138,7 @@
           <a:p>
             <a:fld id="{99BCB60A-E9EF-4256-A8F3-CDC6B78250BE}" type="datetimeFigureOut">
               <a:rPr lang="de-DE" smtClean="0"/>
-              <a:t>10.03.2022</a:t>
+              <a:t>29.09.2022</a:t>
             </a:fld>
             <a:endParaRPr lang="de-DE"/>
           </a:p>
@@ -1403,7 +1403,7 @@
           <a:p>
             <a:fld id="{99BCB60A-E9EF-4256-A8F3-CDC6B78250BE}" type="datetimeFigureOut">
               <a:rPr lang="de-DE" smtClean="0"/>
-              <a:t>10.03.2022</a:t>
+              <a:t>29.09.2022</a:t>
             </a:fld>
             <a:endParaRPr lang="de-DE"/>
           </a:p>
@@ -1815,7 +1815,7 @@
           <a:p>
             <a:fld id="{99BCB60A-E9EF-4256-A8F3-CDC6B78250BE}" type="datetimeFigureOut">
               <a:rPr lang="de-DE" smtClean="0"/>
-              <a:t>10.03.2022</a:t>
+              <a:t>29.09.2022</a:t>
             </a:fld>
             <a:endParaRPr lang="de-DE"/>
           </a:p>
@@ -1956,7 +1956,7 @@
           <a:p>
             <a:fld id="{99BCB60A-E9EF-4256-A8F3-CDC6B78250BE}" type="datetimeFigureOut">
               <a:rPr lang="de-DE" smtClean="0"/>
-              <a:t>10.03.2022</a:t>
+              <a:t>29.09.2022</a:t>
             </a:fld>
             <a:endParaRPr lang="de-DE"/>
           </a:p>
@@ -2069,7 +2069,7 @@
           <a:p>
             <a:fld id="{99BCB60A-E9EF-4256-A8F3-CDC6B78250BE}" type="datetimeFigureOut">
               <a:rPr lang="de-DE" smtClean="0"/>
-              <a:t>10.03.2022</a:t>
+              <a:t>29.09.2022</a:t>
             </a:fld>
             <a:endParaRPr lang="de-DE"/>
           </a:p>
@@ -2380,7 +2380,7 @@
           <a:p>
             <a:fld id="{99BCB60A-E9EF-4256-A8F3-CDC6B78250BE}" type="datetimeFigureOut">
               <a:rPr lang="de-DE" smtClean="0"/>
-              <a:t>10.03.2022</a:t>
+              <a:t>29.09.2022</a:t>
             </a:fld>
             <a:endParaRPr lang="de-DE"/>
           </a:p>
@@ -2668,7 +2668,7 @@
           <a:p>
             <a:fld id="{99BCB60A-E9EF-4256-A8F3-CDC6B78250BE}" type="datetimeFigureOut">
               <a:rPr lang="de-DE" smtClean="0"/>
-              <a:t>10.03.2022</a:t>
+              <a:t>29.09.2022</a:t>
             </a:fld>
             <a:endParaRPr lang="de-DE"/>
           </a:p>
@@ -2909,7 +2909,7 @@
           <a:p>
             <a:fld id="{99BCB60A-E9EF-4256-A8F3-CDC6B78250BE}" type="datetimeFigureOut">
               <a:rPr lang="de-DE" smtClean="0"/>
-              <a:t>10.03.2022</a:t>
+              <a:t>29.09.2022</a:t>
             </a:fld>
             <a:endParaRPr lang="de-DE"/>
           </a:p>
@@ -3392,8 +3392,8 @@
         </p:nvSpPr>
         <p:spPr>
           <a:xfrm>
-            <a:off x="7517854" y="1046981"/>
-            <a:ext cx="4080669" cy="4494436"/>
+            <a:off x="7517855" y="1046981"/>
+            <a:ext cx="3861346" cy="4494436"/>
           </a:xfrm>
           <a:prstGeom prst="rect">
             <a:avLst/>
@@ -3436,7 +3436,7 @@
           <a:p>
             <a:r>
               <a:rPr lang="de-DE" sz="1400" b="1" u="sng" dirty="0"/>
-              <a:t>Trace Method Client</a:t>
+              <a:t>Log Client</a:t>
             </a:r>
           </a:p>
         </p:txBody>
@@ -3507,7 +3507,7 @@
                 </a:solidFill>
                 <a:latin typeface="Consolas" panose="020B0609020204030204" pitchFamily="49" charset="0"/>
               </a:rPr>
-              <a:t>CIpcTrcServer</a:t>
+              <a:t>CIpcLogServer</a:t>
             </a:r>
             <a:endParaRPr lang="de-DE" sz="1200" b="1" dirty="0">
               <a:solidFill>
@@ -3585,7 +3585,7 @@
                 </a:solidFill>
                 <a:latin typeface="Consolas" panose="020B0609020204030204" pitchFamily="49" charset="0"/>
               </a:rPr>
-              <a:t>CTrcServer</a:t>
+              <a:t>CLogServer</a:t>
             </a:r>
             <a:endParaRPr lang="de-DE" sz="1200" dirty="0">
               <a:solidFill>
@@ -3763,7 +3763,7 @@
                 </a:solidFill>
                 <a:latin typeface="Consolas" panose="020B0609020204030204" pitchFamily="49" charset="0"/>
               </a:rPr>
-              <a:t>CIdxTreeTrcAdminObjs</a:t>
+              <a:t>CIdxTreeLoggers</a:t>
             </a:r>
             <a:endParaRPr lang="de-DE" sz="1200" dirty="0">
               <a:solidFill>
@@ -3985,7 +3985,7 @@
           <a:p>
             <a:r>
               <a:rPr lang="de-DE" sz="1400" dirty="0"/>
-              <a:t>Trace.log</a:t>
+              <a:t>LogFile.log</a:t>
             </a:r>
           </a:p>
         </p:txBody>
@@ -4056,7 +4056,7 @@
                 </a:solidFill>
                 <a:latin typeface="Consolas" panose="020B0609020204030204" pitchFamily="49" charset="0"/>
               </a:rPr>
-              <a:t>CTrcAdminObj</a:t>
+              <a:t>CLogger</a:t>
             </a:r>
             <a:endParaRPr lang="de-DE" sz="1200" dirty="0">
               <a:solidFill>
@@ -4212,7 +4212,7 @@
                 </a:solidFill>
                 <a:latin typeface="Consolas" panose="020B0609020204030204" pitchFamily="49" charset="0"/>
               </a:rPr>
-              <a:t>CIpcTrcClient</a:t>
+              <a:t>CIpcLogClient</a:t>
             </a:r>
             <a:endParaRPr lang="de-DE" sz="1200" b="1" dirty="0">
               <a:solidFill>
@@ -4379,7 +4379,7 @@
                 </a:solidFill>
                 <a:latin typeface="Consolas" panose="020B0609020204030204" pitchFamily="49" charset="0"/>
               </a:rPr>
-              <a:t>CIdxTreeTrcAdminObjs</a:t>
+              <a:t>CIdxTreeLoggers</a:t>
             </a:r>
             <a:endParaRPr lang="de-DE" sz="1200" dirty="0">
               <a:solidFill>
@@ -4457,7 +4457,7 @@
                 </a:solidFill>
                 <a:latin typeface="Consolas" panose="020B0609020204030204" pitchFamily="49" charset="0"/>
               </a:rPr>
-              <a:t>CTrcAdminObj</a:t>
+              <a:t>CLogger</a:t>
             </a:r>
             <a:endParaRPr lang="de-DE" sz="1200" dirty="0">
               <a:solidFill>
@@ -4564,7 +4564,7 @@
         <p:spPr>
           <a:xfrm>
             <a:off x="9915825" y="3253586"/>
-            <a:ext cx="1509260" cy="290050"/>
+            <a:ext cx="1260173" cy="290050"/>
           </a:xfrm>
           <a:prstGeom prst="rect">
             <a:avLst/>
@@ -4613,7 +4613,7 @@
                 </a:solidFill>
                 <a:latin typeface="Consolas" panose="020B0609020204030204" pitchFamily="49" charset="0"/>
               </a:rPr>
-              <a:t>CWdgtTrcMthList</a:t>
+              <a:t>CWdgtLog</a:t>
             </a:r>
             <a:endParaRPr lang="de-DE" sz="1200" dirty="0">
               <a:solidFill>

</xml_diff>